<commit_message>
next step adding figs to Supplementary materials
</commit_message>
<xml_diff>
--- a/results/Fig1and2_timeline.pptx
+++ b/results/Fig1and2_timeline.pptx
@@ -247,7 +247,7 @@
           <a:p>
             <a:fld id="{1D70F664-32DE-46B7-B014-797C719CCA64}" type="datetimeFigureOut">
               <a:rPr lang="en-US" smtClean="0"/>
-              <a:t>20-Dec-20</a:t>
+              <a:t>21-Dec-20</a:t>
             </a:fld>
             <a:endParaRPr lang="en-US"/>
           </a:p>
@@ -417,7 +417,7 @@
           <a:p>
             <a:fld id="{1D70F664-32DE-46B7-B014-797C719CCA64}" type="datetimeFigureOut">
               <a:rPr lang="en-US" smtClean="0"/>
-              <a:t>20-Dec-20</a:t>
+              <a:t>21-Dec-20</a:t>
             </a:fld>
             <a:endParaRPr lang="en-US"/>
           </a:p>
@@ -597,7 +597,7 @@
           <a:p>
             <a:fld id="{1D70F664-32DE-46B7-B014-797C719CCA64}" type="datetimeFigureOut">
               <a:rPr lang="en-US" smtClean="0"/>
-              <a:t>20-Dec-20</a:t>
+              <a:t>21-Dec-20</a:t>
             </a:fld>
             <a:endParaRPr lang="en-US"/>
           </a:p>
@@ -767,7 +767,7 @@
           <a:p>
             <a:fld id="{1D70F664-32DE-46B7-B014-797C719CCA64}" type="datetimeFigureOut">
               <a:rPr lang="en-US" smtClean="0"/>
-              <a:t>20-Dec-20</a:t>
+              <a:t>21-Dec-20</a:t>
             </a:fld>
             <a:endParaRPr lang="en-US"/>
           </a:p>
@@ -1013,7 +1013,7 @@
           <a:p>
             <a:fld id="{1D70F664-32DE-46B7-B014-797C719CCA64}" type="datetimeFigureOut">
               <a:rPr lang="en-US" smtClean="0"/>
-              <a:t>20-Dec-20</a:t>
+              <a:t>21-Dec-20</a:t>
             </a:fld>
             <a:endParaRPr lang="en-US"/>
           </a:p>
@@ -1245,7 +1245,7 @@
           <a:p>
             <a:fld id="{1D70F664-32DE-46B7-B014-797C719CCA64}" type="datetimeFigureOut">
               <a:rPr lang="en-US" smtClean="0"/>
-              <a:t>20-Dec-20</a:t>
+              <a:t>21-Dec-20</a:t>
             </a:fld>
             <a:endParaRPr lang="en-US"/>
           </a:p>
@@ -1612,7 +1612,7 @@
           <a:p>
             <a:fld id="{1D70F664-32DE-46B7-B014-797C719CCA64}" type="datetimeFigureOut">
               <a:rPr lang="en-US" smtClean="0"/>
-              <a:t>20-Dec-20</a:t>
+              <a:t>21-Dec-20</a:t>
             </a:fld>
             <a:endParaRPr lang="en-US"/>
           </a:p>
@@ -1730,7 +1730,7 @@
           <a:p>
             <a:fld id="{1D70F664-32DE-46B7-B014-797C719CCA64}" type="datetimeFigureOut">
               <a:rPr lang="en-US" smtClean="0"/>
-              <a:t>20-Dec-20</a:t>
+              <a:t>21-Dec-20</a:t>
             </a:fld>
             <a:endParaRPr lang="en-US"/>
           </a:p>
@@ -1825,7 +1825,7 @@
           <a:p>
             <a:fld id="{1D70F664-32DE-46B7-B014-797C719CCA64}" type="datetimeFigureOut">
               <a:rPr lang="en-US" smtClean="0"/>
-              <a:t>20-Dec-20</a:t>
+              <a:t>21-Dec-20</a:t>
             </a:fld>
             <a:endParaRPr lang="en-US"/>
           </a:p>
@@ -2102,7 +2102,7 @@
           <a:p>
             <a:fld id="{1D70F664-32DE-46B7-B014-797C719CCA64}" type="datetimeFigureOut">
               <a:rPr lang="en-US" smtClean="0"/>
-              <a:t>20-Dec-20</a:t>
+              <a:t>21-Dec-20</a:t>
             </a:fld>
             <a:endParaRPr lang="en-US"/>
           </a:p>
@@ -2355,7 +2355,7 @@
           <a:p>
             <a:fld id="{1D70F664-32DE-46B7-B014-797C719CCA64}" type="datetimeFigureOut">
               <a:rPr lang="en-US" smtClean="0"/>
-              <a:t>20-Dec-20</a:t>
+              <a:t>21-Dec-20</a:t>
             </a:fld>
             <a:endParaRPr lang="en-US"/>
           </a:p>
@@ -2568,7 +2568,7 @@
           <a:p>
             <a:fld id="{1D70F664-32DE-46B7-B014-797C719CCA64}" type="datetimeFigureOut">
               <a:rPr lang="en-US" smtClean="0"/>
-              <a:t>20-Dec-20</a:t>
+              <a:t>21-Dec-20</a:t>
             </a:fld>
             <a:endParaRPr lang="en-US"/>
           </a:p>
@@ -13622,8 +13622,8 @@
         </p:nvSpPr>
         <p:spPr>
           <a:xfrm>
-            <a:off x="2642461" y="4248696"/>
-            <a:ext cx="1166532" cy="338554"/>
+            <a:off x="2304027" y="4248696"/>
+            <a:ext cx="1504966" cy="338554"/>
           </a:xfrm>
           <a:prstGeom prst="rect">
             <a:avLst/>
@@ -13638,13 +13638,13 @@
           <a:p>
             <a:pPr algn="r"/>
             <a:r>
-              <a:rPr lang="en-US" sz="1600" dirty="0" smtClean="0">
+              <a:rPr lang="en-US" sz="1600" b="1" dirty="0" smtClean="0">
                 <a:latin typeface="Times New Roman" panose="02020603050405020304" pitchFamily="18" charset="0"/>
                 <a:cs typeface="Times New Roman" panose="02020603050405020304" pitchFamily="18" charset="0"/>
               </a:rPr>
-              <a:t>Expansion</a:t>
-            </a:r>
-            <a:endParaRPr lang="en-US" sz="1600" dirty="0">
+              <a:t>Main Analysis</a:t>
+            </a:r>
+            <a:endParaRPr lang="en-US" sz="1600" b="1" dirty="0">
               <a:latin typeface="Times New Roman" panose="02020603050405020304" pitchFamily="18" charset="0"/>
               <a:cs typeface="Times New Roman" panose="02020603050405020304" pitchFamily="18" charset="0"/>
             </a:endParaRPr>
@@ -16001,8 +16001,8 @@
         </p:nvSpPr>
         <p:spPr>
           <a:xfrm>
-            <a:off x="764983" y="4271116"/>
-            <a:ext cx="960100" cy="338554"/>
+            <a:off x="764982" y="4271116"/>
+            <a:ext cx="1287283" cy="338554"/>
           </a:xfrm>
           <a:prstGeom prst="rect">
             <a:avLst/>
@@ -16016,13 +16016,13 @@
           <a:lstStyle/>
           <a:p>
             <a:r>
-              <a:rPr lang="en-US" sz="1600" i="1" dirty="0" smtClean="0">
+              <a:rPr lang="en-US" sz="1600" b="1" i="1" dirty="0" smtClean="0">
                 <a:latin typeface="Times New Roman" panose="02020603050405020304" pitchFamily="18" charset="0"/>
                 <a:cs typeface="Times New Roman" panose="02020603050405020304" pitchFamily="18" charset="0"/>
               </a:rPr>
               <a:t>Phase III</a:t>
             </a:r>
-            <a:endParaRPr lang="en-US" sz="1600" i="1" dirty="0">
+            <a:endParaRPr lang="en-US" sz="1600" b="1" i="1" dirty="0">
               <a:latin typeface="Times New Roman" panose="02020603050405020304" pitchFamily="18" charset="0"/>
               <a:cs typeface="Times New Roman" panose="02020603050405020304" pitchFamily="18" charset="0"/>
             </a:endParaRPr>

</xml_diff>